<commit_message>
faccio l'upload dei documenti
</commit_message>
<xml_diff>
--- a/Weka/varie/presentazione applicazioni IA.pptx
+++ b/Weka/varie/presentazione applicazioni IA.pptx
@@ -140,8 +140,8 @@
           <c:xMode val="edge"/>
           <c:yMode val="edge"/>
           <c:x val="0.115858486439195"/>
-          <c:y val="6.3898887639045207E-2"/>
-          <c:w val="0.64140500547667856"/>
+          <c:y val="6.3898887639045235E-2"/>
+          <c:w val="0.64140500547667878"/>
           <c:h val="0.79163849274085563"/>
         </c:manualLayout>
       </c:layout>
@@ -189,16 +189,16 @@
                 <c:formatCode>General</c:formatCode>
                 <c:ptCount val="4"/>
                 <c:pt idx="0">
-                  <c:v>1.0000000000000012E-2</c:v>
+                  <c:v>1.0000000000000016E-2</c:v>
                 </c:pt>
                 <c:pt idx="1">
-                  <c:v>2.0000000000000025E-2</c:v>
+                  <c:v>2.0000000000000032E-2</c:v>
                 </c:pt>
                 <c:pt idx="2">
-                  <c:v>2.0000000000000025E-2</c:v>
+                  <c:v>2.0000000000000032E-2</c:v>
                 </c:pt>
                 <c:pt idx="3">
-                  <c:v>3.0000000000000037E-2</c:v>
+                  <c:v>3.0000000000000047E-2</c:v>
                 </c:pt>
               </c:numCache>
             </c:numRef>
@@ -251,41 +251,41 @@
                 <c:formatCode>General</c:formatCode>
                 <c:ptCount val="4"/>
                 <c:pt idx="0">
-                  <c:v>1.0000000000000012E-2</c:v>
+                  <c:v>1.0000000000000016E-2</c:v>
                 </c:pt>
                 <c:pt idx="1">
-                  <c:v>2.0000000000000025E-2</c:v>
+                  <c:v>2.0000000000000032E-2</c:v>
                 </c:pt>
                 <c:pt idx="2">
-                  <c:v>2.0000000000000025E-2</c:v>
+                  <c:v>2.0000000000000032E-2</c:v>
                 </c:pt>
                 <c:pt idx="3">
-                  <c:v>3.0000000000000037E-2</c:v>
+                  <c:v>3.0000000000000047E-2</c:v>
                 </c:pt>
               </c:numCache>
             </c:numRef>
           </c:val>
         </c:ser>
-        <c:axId val="67259392"/>
-        <c:axId val="69974656"/>
-        <c:axId val="38310336"/>
+        <c:axId val="80182656"/>
+        <c:axId val="84436096"/>
+        <c:axId val="80125952"/>
       </c:line3DChart>
       <c:catAx>
-        <c:axId val="67259392"/>
+        <c:axId val="80182656"/>
         <c:scaling>
           <c:orientation val="minMax"/>
         </c:scaling>
         <c:axPos val="b"/>
         <c:numFmt formatCode="General" sourceLinked="1"/>
         <c:tickLblPos val="nextTo"/>
-        <c:crossAx val="69974656"/>
+        <c:crossAx val="84436096"/>
         <c:crosses val="autoZero"/>
         <c:auto val="1"/>
         <c:lblAlgn val="ctr"/>
         <c:lblOffset val="100"/>
       </c:catAx>
       <c:valAx>
-        <c:axId val="69974656"/>
+        <c:axId val="84436096"/>
         <c:scaling>
           <c:orientation val="minMax"/>
         </c:scaling>
@@ -293,18 +293,18 @@
         <c:majorGridlines/>
         <c:numFmt formatCode="General" sourceLinked="1"/>
         <c:tickLblPos val="nextTo"/>
-        <c:crossAx val="67259392"/>
+        <c:crossAx val="80182656"/>
         <c:crosses val="autoZero"/>
         <c:crossBetween val="between"/>
       </c:valAx>
       <c:serAx>
-        <c:axId val="38310336"/>
+        <c:axId val="80125952"/>
         <c:scaling>
           <c:orientation val="minMax"/>
         </c:scaling>
         <c:axPos val="b"/>
         <c:tickLblPos val="nextTo"/>
-        <c:crossAx val="69974656"/>
+        <c:crossAx val="84436096"/>
         <c:crosses val="autoZero"/>
       </c:serAx>
     </c:plotArea>
@@ -3690,7 +3690,7 @@
             <a:fld id="{8B0A72A2-EF07-44FF-820F-8E48E67CE48C}" type="datetimeFigureOut">
               <a:rPr lang="it-IT" smtClean="0"/>
               <a:pPr/>
-              <a:t>02/02/2011</a:t>
+              <a:t>03/02/2011</a:t>
             </a:fld>
             <a:endParaRPr lang="it-IT"/>
           </a:p>
@@ -3857,7 +3857,7 @@
             <a:fld id="{8B0A72A2-EF07-44FF-820F-8E48E67CE48C}" type="datetimeFigureOut">
               <a:rPr lang="it-IT" smtClean="0"/>
               <a:pPr/>
-              <a:t>02/02/2011</a:t>
+              <a:t>03/02/2011</a:t>
             </a:fld>
             <a:endParaRPr lang="it-IT"/>
           </a:p>
@@ -4034,7 +4034,7 @@
             <a:fld id="{8B0A72A2-EF07-44FF-820F-8E48E67CE48C}" type="datetimeFigureOut">
               <a:rPr lang="it-IT" smtClean="0"/>
               <a:pPr/>
-              <a:t>02/02/2011</a:t>
+              <a:t>03/02/2011</a:t>
             </a:fld>
             <a:endParaRPr lang="it-IT"/>
           </a:p>
@@ -4205,7 +4205,7 @@
             <a:fld id="{8B0A72A2-EF07-44FF-820F-8E48E67CE48C}" type="datetimeFigureOut">
               <a:rPr lang="it-IT" smtClean="0"/>
               <a:pPr/>
-              <a:t>02/02/2011</a:t>
+              <a:t>03/02/2011</a:t>
             </a:fld>
             <a:endParaRPr lang="it-IT"/>
           </a:p>
@@ -4662,7 +4662,7 @@
             <a:fld id="{8B0A72A2-EF07-44FF-820F-8E48E67CE48C}" type="datetimeFigureOut">
               <a:rPr lang="it-IT" smtClean="0"/>
               <a:pPr/>
-              <a:t>02/02/2011</a:t>
+              <a:t>03/02/2011</a:t>
             </a:fld>
             <a:endParaRPr lang="it-IT"/>
           </a:p>
@@ -4928,7 +4928,7 @@
             <a:fld id="{8B0A72A2-EF07-44FF-820F-8E48E67CE48C}" type="datetimeFigureOut">
               <a:rPr lang="it-IT" smtClean="0"/>
               <a:pPr/>
-              <a:t>02/02/2011</a:t>
+              <a:t>03/02/2011</a:t>
             </a:fld>
             <a:endParaRPr lang="it-IT"/>
           </a:p>
@@ -5304,7 +5304,7 @@
             <a:fld id="{8B0A72A2-EF07-44FF-820F-8E48E67CE48C}" type="datetimeFigureOut">
               <a:rPr lang="it-IT" smtClean="0"/>
               <a:pPr/>
-              <a:t>02/02/2011</a:t>
+              <a:t>03/02/2011</a:t>
             </a:fld>
             <a:endParaRPr lang="it-IT"/>
           </a:p>
@@ -5428,7 +5428,7 @@
             <a:fld id="{8B0A72A2-EF07-44FF-820F-8E48E67CE48C}" type="datetimeFigureOut">
               <a:rPr lang="it-IT" smtClean="0"/>
               <a:pPr/>
-              <a:t>02/02/2011</a:t>
+              <a:t>03/02/2011</a:t>
             </a:fld>
             <a:endParaRPr lang="it-IT"/>
           </a:p>
@@ -5520,7 +5520,7 @@
             <a:fld id="{8B0A72A2-EF07-44FF-820F-8E48E67CE48C}" type="datetimeFigureOut">
               <a:rPr lang="it-IT" smtClean="0"/>
               <a:pPr/>
-              <a:t>02/02/2011</a:t>
+              <a:t>03/02/2011</a:t>
             </a:fld>
             <a:endParaRPr lang="it-IT"/>
           </a:p>
@@ -5771,7 +5771,7 @@
             <a:fld id="{8B0A72A2-EF07-44FF-820F-8E48E67CE48C}" type="datetimeFigureOut">
               <a:rPr lang="it-IT" smtClean="0"/>
               <a:pPr/>
-              <a:t>02/02/2011</a:t>
+              <a:t>03/02/2011</a:t>
             </a:fld>
             <a:endParaRPr lang="it-IT"/>
           </a:p>
@@ -6032,7 +6032,7 @@
             <a:fld id="{8B0A72A2-EF07-44FF-820F-8E48E67CE48C}" type="datetimeFigureOut">
               <a:rPr lang="it-IT" smtClean="0"/>
               <a:pPr/>
-              <a:t>02/02/2011</a:t>
+              <a:t>03/02/2011</a:t>
             </a:fld>
             <a:endParaRPr lang="it-IT"/>
           </a:p>
@@ -6438,7 +6438,7 @@
             <a:fld id="{8B0A72A2-EF07-44FF-820F-8E48E67CE48C}" type="datetimeFigureOut">
               <a:rPr lang="it-IT" smtClean="0"/>
               <a:pPr/>
-              <a:t>02/02/2011</a:t>
+              <a:t>03/02/2011</a:t>
             </a:fld>
             <a:endParaRPr lang="it-IT"/>
           </a:p>
@@ -8090,11 +8090,7 @@
             </a:r>
             <a:r>
               <a:rPr lang="it-IT" dirty="0" smtClean="0"/>
-              <a:t> ed il relativo guadagno informativo di Nanni  per un attributo</a:t>
-            </a:r>
-            <a:r>
-              <a:rPr lang="it-IT" dirty="0" smtClean="0"/>
-              <a:t>.</a:t>
+              <a:t> ed il relativo guadagno informativo di Nanni  per un attributo.</a:t>
             </a:r>
           </a:p>
           <a:p>
@@ -8115,11 +8111,7 @@
             </a:r>
             <a:r>
               <a:rPr lang="it-IT" dirty="0" smtClean="0"/>
-              <a:t> e </a:t>
-            </a:r>
-            <a:r>
-              <a:rPr lang="it-IT" dirty="0" smtClean="0"/>
-              <a:t>setter</a:t>
+              <a:t> e setter</a:t>
             </a:r>
           </a:p>
           <a:p>
@@ -8587,11 +8579,7 @@
             </a:r>
             <a:r>
               <a:rPr lang="it-IT" dirty="0" smtClean="0"/>
-              <a:t> tra quelli disponibili in base al guadagno informativo di Nanni</a:t>
-            </a:r>
-            <a:r>
-              <a:rPr lang="it-IT" dirty="0" smtClean="0"/>
-              <a:t>.</a:t>
+              <a:t> tra quelli disponibili in base al guadagno informativo di Nanni.</a:t>
             </a:r>
           </a:p>
           <a:p>
@@ -8624,11 +8612,7 @@
             </a:r>
             <a:r>
               <a:rPr lang="it-IT" dirty="0" smtClean="0"/>
-              <a:t> e </a:t>
-            </a:r>
-            <a:r>
-              <a:rPr lang="it-IT" dirty="0" smtClean="0"/>
-              <a:t>setter</a:t>
+              <a:t> e setter</a:t>
             </a:r>
           </a:p>
           <a:p>
@@ -9133,11 +9117,7 @@
             </a:r>
             <a:r>
               <a:rPr lang="it-IT" sz="1600" dirty="0" smtClean="0"/>
-              <a:t> rappresenta il classificatore vero e </a:t>
-            </a:r>
-            <a:r>
-              <a:rPr lang="it-IT" sz="1600" dirty="0" smtClean="0"/>
-              <a:t>proprio</a:t>
+              <a:t> rappresenta il classificatore vero e proprio</a:t>
             </a:r>
           </a:p>
           <a:p>
@@ -9158,11 +9138,7 @@
             </a:r>
             <a:r>
               <a:rPr lang="it-IT" sz="1600" dirty="0" smtClean="0"/>
-              <a:t> dove tiene memorizzati i pesi specificati </a:t>
-            </a:r>
-            <a:r>
-              <a:rPr lang="it-IT" sz="1600" dirty="0" smtClean="0"/>
-              <a:t>dall’utente</a:t>
+              <a:t> dove tiene memorizzati i pesi specificati dall’utente</a:t>
             </a:r>
           </a:p>
           <a:p>
@@ -9195,11 +9171,7 @@
             </a:r>
             <a:r>
               <a:rPr lang="it-IT" sz="1600" dirty="0" smtClean="0"/>
-              <a:t>, al quale passa i pesi definisti </a:t>
-            </a:r>
-            <a:r>
-              <a:rPr lang="it-IT" sz="1600" dirty="0" smtClean="0"/>
-              <a:t>dall’utente</a:t>
+              <a:t>, al quale passa i pesi definisti dall’utente</a:t>
             </a:r>
           </a:p>
           <a:p>
@@ -9256,11 +9228,7 @@
             </a:r>
             <a:r>
               <a:rPr lang="it-IT" sz="1600" dirty="0" smtClean="0"/>
-              <a:t> per permettere all’utente di specificare i pesi nella finestra delle </a:t>
-            </a:r>
-            <a:r>
-              <a:rPr lang="it-IT" sz="1600" dirty="0" smtClean="0"/>
-              <a:t>opzioni</a:t>
+              <a:t> per permettere all’utente di specificare i pesi nella finestra delle opzioni</a:t>
             </a:r>
           </a:p>
           <a:p>
@@ -9301,11 +9269,7 @@
             </a:r>
             <a:r>
               <a:rPr lang="it-IT" sz="1600" dirty="0" smtClean="0"/>
-              <a:t> per far sì che il classificatore sia utilizzabile anche attraverso l’interfaccia a linea di comando</a:t>
-            </a:r>
-            <a:r>
-              <a:rPr lang="it-IT" sz="1600" dirty="0" smtClean="0"/>
-              <a:t>.</a:t>
+              <a:t> per far sì che il classificatore sia utilizzabile anche attraverso l’interfaccia a linea di comando.</a:t>
             </a:r>
           </a:p>
           <a:p>
@@ -9469,11 +9433,7 @@
           <a:p>
             <a:r>
               <a:rPr lang="it-IT" dirty="0" smtClean="0"/>
-              <a:t>Per testare l’efficacia dell’algoritmo creato si è </a:t>
-            </a:r>
-            <a:r>
-              <a:rPr lang="it-IT" dirty="0" smtClean="0"/>
-              <a:t>usato il </a:t>
+              <a:t>Per testare l’efficacia dell’algoritmo creato si è usato il </a:t>
             </a:r>
             <a:r>
               <a:rPr lang="it-IT" dirty="0" err="1" smtClean="0"/>
@@ -9536,15 +9496,7 @@
             </a:r>
             <a:r>
               <a:rPr lang="it-IT" sz="1600" dirty="0" smtClean="0"/>
-              <a:t> </a:t>
-            </a:r>
-            <a:r>
-              <a:rPr lang="it-IT" sz="1600" dirty="0" smtClean="0"/>
-              <a:t>eseguito da J48 è in </a:t>
-            </a:r>
-            <a:r>
-              <a:rPr lang="it-IT" sz="1600" dirty="0" smtClean="0"/>
-              <a:t>base all’attributo CORE STBL, attributo legato alla stabilità della temperatura interna del paziente</a:t>
+              <a:t> eseguito da J48 è in base all’attributo CORE STBL, attributo legato alla stabilità della temperatura interna del paziente</a:t>
             </a:r>
             <a:endParaRPr lang="it-IT" sz="1600" dirty="0"/>
           </a:p>
@@ -9611,19 +9563,23 @@
           <a:p>
             <a:r>
               <a:rPr lang="it-IT" sz="1600" dirty="0" smtClean="0"/>
-              <a:t>Il peso di CORESTBL è </a:t>
-            </a:r>
-            <a:r>
-              <a:rPr lang="it-IT" sz="1600" dirty="0" err="1" smtClean="0"/>
-              <a:t>statgo</a:t>
+              <a:t>Se </a:t>
             </a:r>
             <a:r>
               <a:rPr lang="it-IT" sz="1600" dirty="0" smtClean="0"/>
-              <a:t> abbassato a 0.5. Gli </a:t>
+              <a:t>peso di CORESTBL </a:t>
             </a:r>
             <a:r>
               <a:rPr lang="it-IT" sz="1600" dirty="0" smtClean="0"/>
-              <a:t>è preferito l’attributo COMFORT , il quale indica quanto si sente bene il paziente</a:t>
+              <a:t>viene </a:t>
+            </a:r>
+            <a:r>
+              <a:rPr lang="it-IT" sz="1600" smtClean="0"/>
+              <a:t>ridotto a </a:t>
+            </a:r>
+            <a:r>
+              <a:rPr lang="it-IT" sz="1600" dirty="0" smtClean="0"/>
+              <a:t>0.5. Gli è preferito l’attributo COMFORT , il quale indica quanto si sente bene il paziente</a:t>
             </a:r>
             <a:endParaRPr lang="it-IT" sz="1600" dirty="0"/>
           </a:p>
@@ -9804,11 +9760,7 @@
             </a:pPr>
             <a:r>
               <a:rPr lang="it-IT" sz="2000" dirty="0" smtClean="0"/>
-              <a:t>L’accuratezza del classificatore dipende molto da quanto vengono penalizzati gli attributi che più sono utili a determinare la classe risultato</a:t>
-            </a:r>
-            <a:r>
-              <a:rPr lang="it-IT" sz="2000" dirty="0" smtClean="0"/>
-              <a:t>.</a:t>
+              <a:t>L’accuratezza del classificatore dipende molto da quanto vengono penalizzati gli attributi che più sono utili a determinare la classe risultato.</a:t>
             </a:r>
           </a:p>
           <a:p>
@@ -9825,13 +9777,8 @@
             </a:pPr>
             <a:r>
               <a:rPr lang="it-IT" sz="2000" dirty="0" smtClean="0"/>
-              <a:t> </a:t>
-            </a:r>
-            <a:r>
-              <a:rPr lang="it-IT" sz="2000" dirty="0" smtClean="0"/>
-              <a:t>Più questi attributi sono penalizzati da un peso basso, peggiore sarà l’accuratezza del classificatore. </a:t>
-            </a:r>
-            <a:endParaRPr lang="it-IT" sz="2000" dirty="0" smtClean="0"/>
+              <a:t> Più questi attributi sono penalizzati da un peso basso, peggiore sarà l’accuratezza del classificatore. </a:t>
+            </a:r>
           </a:p>
           <a:p>
             <a:pPr>
@@ -9847,11 +9794,7 @@
             </a:pPr>
             <a:r>
               <a:rPr lang="it-IT" sz="2000" dirty="0" smtClean="0"/>
-              <a:t>Questa </a:t>
-            </a:r>
-            <a:r>
-              <a:rPr lang="it-IT" sz="2000" dirty="0" smtClean="0"/>
-              <a:t>misura, come facile intuire, ha come upper </a:t>
+              <a:t>Questa misura, come facile intuire, ha come upper </a:t>
             </a:r>
             <a:r>
               <a:rPr lang="it-IT" sz="2000" dirty="0" err="1" smtClean="0"/>
@@ -9861,7 +9804,6 @@
               <a:rPr lang="it-IT" sz="2000" dirty="0" smtClean="0"/>
               <a:t> quella di C45, corrispondente all’avere pesi uguali per tutti gli attributi. </a:t>
             </a:r>
-            <a:endParaRPr lang="it-IT" sz="2000" dirty="0" smtClean="0"/>
           </a:p>
           <a:p>
             <a:pPr>
@@ -9877,11 +9819,7 @@
             </a:pPr>
             <a:r>
               <a:rPr lang="it-IT" sz="2000" dirty="0" smtClean="0"/>
-              <a:t>Nell’esempio </a:t>
-            </a:r>
-            <a:r>
-              <a:rPr lang="it-IT" sz="2000" dirty="0" smtClean="0"/>
-              <a:t>precedente, usando come test-set il 20% del </a:t>
+              <a:t>Nell’esempio precedente, usando come test-set il 20% del </a:t>
             </a:r>
             <a:r>
               <a:rPr lang="it-IT" sz="2000" dirty="0" err="1" smtClean="0"/>
@@ -10062,28 +10000,16 @@
             </a:r>
             <a:r>
               <a:rPr lang="it-IT" dirty="0" smtClean="0"/>
-              <a:t> </a:t>
-            </a:r>
+              <a:t> )</a:t>
+            </a:r>
+          </a:p>
+          <a:p>
+            <a:endParaRPr lang="it-IT" dirty="0" smtClean="0"/>
+          </a:p>
+          <a:p>
             <a:r>
               <a:rPr lang="it-IT" dirty="0" smtClean="0"/>
-              <a:t>)</a:t>
-            </a:r>
-          </a:p>
-          <a:p>
-            <a:endParaRPr lang="it-IT" dirty="0" smtClean="0"/>
-          </a:p>
-          <a:p>
-            <a:r>
-              <a:rPr lang="it-IT" dirty="0" smtClean="0"/>
-              <a:t>In particolare </a:t>
-            </a:r>
-            <a:r>
-              <a:rPr lang="it-IT" dirty="0" smtClean="0"/>
-              <a:t>si </a:t>
-            </a:r>
-            <a:r>
-              <a:rPr lang="it-IT" dirty="0" smtClean="0"/>
-              <a:t>è impostata per ogni prova la cross- </a:t>
+              <a:t>In particolare si è impostata per ogni prova la cross- </a:t>
             </a:r>
             <a:r>
               <a:rPr lang="it-IT" dirty="0" err="1" smtClean="0"/>
@@ -10287,15 +10213,7 @@
             </a:pPr>
             <a:r>
               <a:rPr lang="it-IT" dirty="0" smtClean="0"/>
-              <a:t>Attualmente i pesi  </a:t>
-            </a:r>
-            <a:r>
-              <a:rPr lang="it-IT" dirty="0" smtClean="0"/>
-              <a:t>sono dei valori compresi tra zero ed uno e restano invariati per tutta la costruzione dell’albero. In futuro si può prevedere di accettare anche funzioni il cui valore può cambiare, ad esempio, in base alla profondità raggiunta o al numero di istanze presenti nel nodo</a:t>
-            </a:r>
-            <a:r>
-              <a:rPr lang="it-IT" dirty="0" smtClean="0"/>
-              <a:t>.</a:t>
+              <a:t>Attualmente i pesi  sono dei valori compresi tra zero ed uno e restano invariati per tutta la costruzione dell’albero. In futuro si può prevedere di accettare anche funzioni il cui valore può cambiare, ad esempio, in base alla profondità raggiunta o al numero di istanze presenti nel nodo.</a:t>
             </a:r>
           </a:p>
           <a:p>
@@ -10319,35 +10237,7 @@
             </a:pPr>
             <a:r>
               <a:rPr lang="it-IT" dirty="0" smtClean="0"/>
-              <a:t>Si può </a:t>
-            </a:r>
-            <a:r>
-              <a:rPr lang="it-IT" dirty="0" smtClean="0"/>
-              <a:t>pensare ad </a:t>
-            </a:r>
-            <a:r>
-              <a:rPr lang="it-IT" dirty="0" smtClean="0"/>
-              <a:t>un sistema che accetti non solo preferenze </a:t>
-            </a:r>
-            <a:r>
-              <a:rPr lang="it-IT" dirty="0" smtClean="0"/>
-              <a:t>numeriche </a:t>
-            </a:r>
-            <a:r>
-              <a:rPr lang="it-IT" dirty="0" smtClean="0"/>
-              <a:t>(quantitative</a:t>
-            </a:r>
-            <a:r>
-              <a:rPr lang="it-IT" dirty="0" smtClean="0"/>
-              <a:t>), </a:t>
-            </a:r>
-            <a:r>
-              <a:rPr lang="it-IT" dirty="0" smtClean="0"/>
-              <a:t>ma anche </a:t>
-            </a:r>
-            <a:r>
-              <a:rPr lang="it-IT" dirty="0" smtClean="0"/>
-              <a:t>preferenze qualitative e condizionali</a:t>
+              <a:t>Si può pensare ad un sistema che accetti non solo preferenze numeriche (quantitative), ma anche preferenze qualitative e condizionali</a:t>
             </a:r>
           </a:p>
           <a:p>
@@ -10371,15 +10261,7 @@
             </a:pPr>
             <a:r>
               <a:rPr lang="it-IT" dirty="0" smtClean="0"/>
-              <a:t>Si può </a:t>
-            </a:r>
-            <a:r>
-              <a:rPr lang="it-IT" dirty="0" smtClean="0"/>
-              <a:t>aiutare </a:t>
-            </a:r>
-            <a:r>
-              <a:rPr lang="it-IT" dirty="0" smtClean="0"/>
-              <a:t>l’utente nel risolvere il </a:t>
+              <a:t>Si può aiutare l’utente nel risolvere il </a:t>
             </a:r>
             <a:r>
               <a:rPr lang="it-IT" dirty="0" err="1" smtClean="0"/>
@@ -16546,19 +16428,7 @@
             </a:r>
             <a:r>
               <a:rPr lang="it-IT" sz="2000" dirty="0" smtClean="0"/>
-              <a:t>) è un software per l’analisi dei dati sviluppato dall’università di Waikato in Nuova Zelanda, </a:t>
-            </a:r>
-            <a:r>
-              <a:rPr lang="it-IT" sz="2000" dirty="0" smtClean="0"/>
-              <a:t> </a:t>
-            </a:r>
-            <a:r>
-              <a:rPr lang="it-IT" sz="2000" dirty="0" smtClean="0"/>
-              <a:t>scritto in Java e rilasciato sotto licenza </a:t>
-            </a:r>
-            <a:r>
-              <a:rPr lang="it-IT" sz="2000" dirty="0" smtClean="0"/>
-              <a:t>GNU</a:t>
+              <a:t>) è un software per l’analisi dei dati sviluppato dall’università di Waikato in Nuova Zelanda,  scritto in Java e rilasciato sotto licenza GNU</a:t>
             </a:r>
           </a:p>
           <a:p>
@@ -16595,11 +16465,7 @@
             </a:pPr>
             <a:r>
               <a:rPr lang="it-IT" sz="2000" dirty="0" smtClean="0"/>
-              <a:t>Il software permette con molta semplicità di applicare dei metodi di apprendimento automatici ad un set di dati, e analizzarne il </a:t>
-            </a:r>
-            <a:r>
-              <a:rPr lang="it-IT" sz="2000" dirty="0" smtClean="0"/>
-              <a:t>risultato</a:t>
+              <a:t>Il software permette con molta semplicità di applicare dei metodi di apprendimento automatici ad un set di dati, e analizzarne il risultato</a:t>
             </a:r>
           </a:p>
           <a:p>
@@ -16644,11 +16510,7 @@
             </a:r>
             <a:r>
               <a:rPr lang="it-IT" sz="2000" dirty="0" smtClean="0"/>
-              <a:t> è diventato un programma molto diffuso in tutti i corsi </a:t>
-            </a:r>
-            <a:r>
-              <a:rPr lang="it-IT" sz="2000" dirty="0" smtClean="0"/>
-              <a:t>di  </a:t>
+              <a:t> è diventato un programma molto diffuso in tutti i corsi di  </a:t>
             </a:r>
             <a:r>
               <a:rPr lang="it-IT" sz="2000" dirty="0" err="1" smtClean="0"/>
@@ -16666,10 +16528,47 @@
               <a:rPr lang="it-IT" sz="2000" dirty="0" smtClean="0"/>
               <a:t>.</a:t>
             </a:r>
-            <a:endParaRPr lang="it-IT" sz="2000" dirty="0" smtClean="0"/>
           </a:p>
         </p:txBody>
       </p:sp>
+      <p:pic>
+        <p:nvPicPr>
+          <p:cNvPr id="12290" name="Picture 2" descr="http://www.diplod.it/wp-content/uploads/2007/06/logo_weka.gif"/>
+          <p:cNvPicPr>
+            <a:picLocks noChangeAspect="1" noChangeArrowheads="1"/>
+          </p:cNvPicPr>
+          <p:nvPr/>
+        </p:nvPicPr>
+        <p:blipFill>
+          <a:blip r:embed="rId2" cstate="print"/>
+          <a:srcRect/>
+          <a:stretch>
+            <a:fillRect/>
+          </a:stretch>
+        </p:blipFill>
+        <p:spPr bwMode="auto">
+          <a:xfrm>
+            <a:off x="4355976" y="4869160"/>
+            <a:ext cx="1885950" cy="990601"/>
+          </a:xfrm>
+          <a:prstGeom prst="roundRect">
+            <a:avLst>
+              <a:gd name="adj" fmla="val 8594"/>
+            </a:avLst>
+          </a:prstGeom>
+          <a:solidFill>
+            <a:srgbClr val="FFFFFF">
+              <a:shade val="85000"/>
+            </a:srgbClr>
+          </a:solidFill>
+          <a:ln>
+            <a:noFill/>
+          </a:ln>
+          <a:effectLst>
+            <a:reflection blurRad="12700" stA="38000" endPos="28000" dist="5000" dir="5400000" sy="-100000" algn="bl" rotWithShape="0"/>
+          </a:effectLst>
+        </p:spPr>
+      </p:pic>
     </p:spTree>
   </p:cSld>
   <p:clrMapOvr>
@@ -17043,11 +16942,7 @@
             </a:pPr>
             <a:r>
               <a:rPr lang="it-IT" sz="2000" dirty="0" smtClean="0"/>
-              <a:t>Si è sviluppato L’algoritmo come estensione di J48 la versione Java di </a:t>
-            </a:r>
-            <a:r>
-              <a:rPr lang="it-IT" sz="2000" dirty="0" smtClean="0"/>
-              <a:t>C4.5</a:t>
+              <a:t>Si è sviluppato L’algoritmo come estensione di J48 la versione Java di C4.5</a:t>
             </a:r>
           </a:p>
           <a:p>
@@ -17084,13 +16979,8 @@
             </a:pPr>
             <a:r>
               <a:rPr lang="it-IT" sz="2000" dirty="0" smtClean="0"/>
-              <a:t>E’ in </a:t>
-            </a:r>
-            <a:r>
-              <a:rPr lang="it-IT" sz="2000" dirty="0" smtClean="0"/>
-              <a:t>grado di predire attributi categorici basandosi su istanze che presentano </a:t>
-            </a:r>
-            <a:endParaRPr lang="it-IT" sz="2000" dirty="0" smtClean="0"/>
+              <a:t>E’ in grado di predire attributi categorici basandosi su istanze che presentano </a:t>
+            </a:r>
           </a:p>
           <a:p>
             <a:pPr marL="877824" lvl="1" indent="-384048">
@@ -17109,13 +16999,8 @@
             </a:pPr>
             <a:r>
               <a:rPr lang="it-IT" sz="2000" dirty="0" smtClean="0"/>
-              <a:t>attributi </a:t>
-            </a:r>
-            <a:r>
-              <a:rPr lang="it-IT" sz="2000" dirty="0" smtClean="0"/>
-              <a:t>categorici </a:t>
-            </a:r>
-            <a:endParaRPr lang="it-IT" sz="2000" dirty="0" smtClean="0"/>
+              <a:t>attributi categorici </a:t>
+            </a:r>
           </a:p>
           <a:p>
             <a:pPr marL="877824" lvl="1" indent="-384048">
@@ -17134,7 +17019,11 @@
             </a:pPr>
             <a:r>
               <a:rPr lang="it-IT" sz="2000" dirty="0" smtClean="0"/>
-              <a:t>Attributi numerici </a:t>
+              <a:t>attributi </a:t>
+            </a:r>
+            <a:r>
+              <a:rPr lang="it-IT" sz="2000" dirty="0" smtClean="0"/>
+              <a:t>numerici </a:t>
             </a:r>
           </a:p>
           <a:p>
@@ -17154,15 +17043,15 @@
             </a:pPr>
             <a:r>
               <a:rPr lang="it-IT" sz="2000" dirty="0" smtClean="0"/>
-              <a:t>consentendo </a:t>
+              <a:t>t</a:t>
             </a:r>
             <a:r>
               <a:rPr lang="it-IT" sz="2000" dirty="0" smtClean="0"/>
-              <a:t>la presenza di valori </a:t>
+              <a:t>ollerando la </a:t>
             </a:r>
             <a:r>
               <a:rPr lang="it-IT" sz="2000" dirty="0" smtClean="0"/>
-              <a:t>mancanti.</a:t>
+              <a:t>presenza di valori mancanti.</a:t>
             </a:r>
           </a:p>
           <a:p>
@@ -17199,27 +17088,7 @@
             </a:pPr>
             <a:r>
               <a:rPr lang="it-IT" sz="2000" dirty="0" smtClean="0"/>
-              <a:t>L’algoritmo presenta, </a:t>
-            </a:r>
-            <a:r>
-              <a:rPr lang="it-IT" sz="2000" dirty="0" smtClean="0"/>
-              <a:t>inoltre, </a:t>
-            </a:r>
-            <a:r>
-              <a:rPr lang="it-IT" sz="2000" dirty="0" smtClean="0"/>
-              <a:t>tutte le opzioni  fornite da J48, con l’aggiunta </a:t>
-            </a:r>
-            <a:r>
-              <a:rPr lang="it-IT" sz="2000" dirty="0" smtClean="0"/>
-              <a:t>dei </a:t>
-            </a:r>
-            <a:r>
-              <a:rPr lang="it-IT" sz="2000" dirty="0" smtClean="0"/>
-              <a:t>pesi relativi agli </a:t>
-            </a:r>
-            <a:r>
-              <a:rPr lang="it-IT" sz="2000" dirty="0" smtClean="0"/>
-              <a:t>attributi</a:t>
+              <a:t>L’algoritmo presenta, inoltre, tutte le opzioni  fornite da J48, con l’aggiunta dei pesi relativi agli attributi</a:t>
             </a:r>
           </a:p>
           <a:p>
@@ -17261,7 +17130,6 @@
               <a:rPr lang="it-IT" sz="2000" dirty="0" smtClean="0"/>
               <a:t>Se vengono specificati più pesi, quelli eccedenti vengono ignorati</a:t>
             </a:r>
-            <a:endParaRPr lang="it-IT" sz="2000" dirty="0" smtClean="0"/>
           </a:p>
         </p:txBody>
       </p:sp>
@@ -17819,11 +17687,7 @@
             </a:pPr>
             <a:r>
               <a:rPr lang="it-IT" sz="1600" dirty="0" smtClean="0"/>
-              <a:t>La classe principale è J48 che rappresenta l’algoritmo di </a:t>
-            </a:r>
-            <a:r>
-              <a:rPr lang="it-IT" sz="1600" dirty="0" smtClean="0"/>
-              <a:t>classificazione</a:t>
+              <a:t>La classe principale è J48 che rappresenta l’algoritmo di classificazione</a:t>
             </a:r>
           </a:p>
           <a:p>
@@ -17852,19 +17716,11 @@
             </a:r>
             <a:r>
               <a:rPr lang="it-IT" sz="1600" dirty="0" smtClean="0"/>
-              <a:t>, </a:t>
+              <a:t> è </a:t>
             </a:r>
             <a:r>
               <a:rPr lang="it-IT" sz="1600" dirty="0" smtClean="0"/>
-              <a:t>quale </a:t>
-            </a:r>
-            <a:r>
-              <a:rPr lang="it-IT" sz="1600" dirty="0" smtClean="0"/>
-              <a:t>è la struttura dati ad albero usata dal </a:t>
-            </a:r>
-            <a:r>
-              <a:rPr lang="it-IT" sz="1600" dirty="0" smtClean="0"/>
-              <a:t>classificatore. Il suo tipo dipende dalle opzioni</a:t>
+              <a:t>la struttura dati ad albero usata dal classificatore. Il suo tipo dipende dalle opzioni</a:t>
             </a:r>
           </a:p>
           <a:p>
@@ -17933,11 +17789,11 @@
             </a:r>
             <a:r>
               <a:rPr lang="it-IT" dirty="0" smtClean="0"/>
-              <a:t>effettivamente provvede a calcolare </a:t>
+              <a:t>provvede effettivamente  </a:t>
             </a:r>
             <a:r>
               <a:rPr lang="it-IT" dirty="0" smtClean="0"/>
-              <a:t>lo </a:t>
+              <a:t>a calcolare lo </a:t>
             </a:r>
             <a:r>
               <a:rPr lang="it-IT" dirty="0" err="1" smtClean="0"/>

</xml_diff>